<commit_message>
Modificacoes de texto para aprensentação da Sprint
</commit_message>
<xml_diff>
--- a/Documentação/ppts/Apresentação.pptx
+++ b/Documentação/ppts/Apresentação.pptx
@@ -42,21 +42,21 @@
   <p:notesSz cx="6858000" cy="9144000"/>
   <p:embeddedFontLst>
     <p:embeddedFont>
-      <p:font typeface="Roboto Condensed Light" panose="020B0604020202020204" charset="0"/>
+      <p:font typeface="Arvo" panose="020B0604020202020204" charset="0"/>
       <p:regular r:id="rId32"/>
       <p:bold r:id="rId33"/>
       <p:italic r:id="rId34"/>
       <p:boldItalic r:id="rId35"/>
     </p:embeddedFont>
     <p:embeddedFont>
-      <p:font typeface="Arvo" panose="020B0604020202020204" charset="0"/>
+      <p:font typeface="Roboto Condensed" panose="020B0604020202020204" pitchFamily="2" charset="0"/>
       <p:regular r:id="rId36"/>
       <p:bold r:id="rId37"/>
       <p:italic r:id="rId38"/>
       <p:boldItalic r:id="rId39"/>
     </p:embeddedFont>
     <p:embeddedFont>
-      <p:font typeface="Roboto Condensed" panose="020B0604020202020204" charset="0"/>
+      <p:font typeface="Roboto Condensed Light" panose="02000000000000000000" pitchFamily="2" charset="0"/>
       <p:regular r:id="rId40"/>
       <p:bold r:id="rId41"/>
       <p:italic r:id="rId42"/>
@@ -10891,10 +10891,6 @@
           </a:bodyPr>
           <a:lstStyle/>
           <a:p>
-            <a:r>
-              <a:rPr lang="en" sz="3200" dirty="0"/>
-              <a:t/>
-            </a:r>
             <a:br>
               <a:rPr lang="en" sz="3200" dirty="0"/>
             </a:br>
@@ -12720,10 +12716,10 @@
       </p:cxnSp>
       <p:pic>
         <p:nvPicPr>
-          <p:cNvPr id="7" name="Picture 7">
+          <p:cNvPr id="4" name="Imagem 3">
             <a:extLst>
               <a:ext uri="{FF2B5EF4-FFF2-40B4-BE49-F238E27FC236}">
-                <a16:creationId xmlns:a16="http://schemas.microsoft.com/office/drawing/2014/main" id="{56B9381F-97AA-4D40-A848-14307F63640B}"/>
+                <a16:creationId xmlns:a16="http://schemas.microsoft.com/office/drawing/2014/main" id="{D03C31CE-2E52-4893-AF8A-3DE8BC7E9E4C}"/>
               </a:ext>
             </a:extLst>
           </p:cNvPr>
@@ -12740,8 +12736,8 @@
         </p:blipFill>
         <p:spPr>
           <a:xfrm>
-            <a:off x="-24116" y="1325772"/>
-            <a:ext cx="6873096" cy="3872182"/>
+            <a:off x="0" y="1166376"/>
+            <a:ext cx="7070440" cy="3977123"/>
           </a:xfrm>
           <a:prstGeom prst="rect">
             <a:avLst/>
@@ -12926,10 +12922,9 @@
           <a:lstStyle/>
           <a:p>
             <a:r>
-              <a:rPr lang="en-US" dirty="0" smtClean="0"/>
+              <a:rPr lang="en-US" dirty="0"/>
               <a:t>BPMN</a:t>
             </a:r>
-            <a:endParaRPr lang="en-US" dirty="0"/>
           </a:p>
         </p:txBody>
       </p:sp>
@@ -13053,11 +13048,11 @@
           <a:lstStyle/>
           <a:p>
             <a:r>
-              <a:rPr lang="en-US" dirty="0" smtClean="0"/>
+              <a:rPr lang="en-US" dirty="0"/>
               <a:t>BPMN - </a:t>
             </a:r>
             <a:r>
-              <a:rPr lang="en-US" dirty="0" err="1" smtClean="0"/>
+              <a:rPr lang="en-US" dirty="0" err="1"/>
               <a:t>SubProcessos</a:t>
             </a:r>
             <a:endParaRPr lang="en-US" dirty="0"/>
@@ -13451,7 +13446,7 @@
             <a:blip r:embed="rId3">
               <a:extLst>
                 <a:ext uri="{96DAC541-7B7A-43D3-8B79-37D633B846F1}">
-                  <asvg:svgBlip xmlns:asvg="http://schemas.microsoft.com/office/drawing/2016/SVG/main" xmlns="" r:embed="rId4"/>
+                  <asvg:svgBlip xmlns:asvg="http://schemas.microsoft.com/office/drawing/2016/SVG/main" r:embed="rId4"/>
                 </a:ext>
               </a:extLst>
             </a:blip>
@@ -13562,7 +13557,7 @@
             <a:blip r:embed="rId5">
               <a:extLst>
                 <a:ext uri="{96DAC541-7B7A-43D3-8B79-37D633B846F1}">
-                  <asvg:svgBlip xmlns:asvg="http://schemas.microsoft.com/office/drawing/2016/SVG/main" xmlns="" r:embed="rId6"/>
+                  <asvg:svgBlip xmlns:asvg="http://schemas.microsoft.com/office/drawing/2016/SVG/main" r:embed="rId6"/>
                 </a:ext>
               </a:extLst>
             </a:blip>
@@ -13639,10 +13634,9 @@
               <a:buChar char="•"/>
             </a:pPr>
             <a:r>
-              <a:rPr lang="pt-BR" sz="1600" dirty="0" smtClean="0"/>
+              <a:rPr lang="pt-BR" sz="1600" dirty="0"/>
               <a:t>Crescimento de 22% a 25% em 2021</a:t>
             </a:r>
-            <a:endParaRPr lang="pt-BR" sz="1600" dirty="0"/>
           </a:p>
           <a:p>
             <a:endParaRPr lang="pt-BR" sz="1600" dirty="0"/>
@@ -13653,7 +13647,7 @@
               <a:buChar char="•"/>
             </a:pPr>
             <a:r>
-              <a:rPr lang="pt-BR" sz="1600" dirty="0" smtClean="0"/>
+              <a:rPr lang="pt-BR" sz="1600" dirty="0"/>
               <a:t>Crescimento de 31% em média no gasto</a:t>
             </a:r>
           </a:p>
@@ -13671,13 +13665,8 @@
             </a:pPr>
             <a:r>
               <a:rPr lang="pt-BR" sz="1600" dirty="0"/>
-              <a:t>Aumento no </a:t>
+              <a:t>Aumento no consumo</a:t>
             </a:r>
-            <a:r>
-              <a:rPr lang="pt-BR" sz="1600" dirty="0" smtClean="0"/>
-              <a:t>consumo</a:t>
-            </a:r>
-            <a:endParaRPr lang="pt-BR" sz="1600" dirty="0"/>
           </a:p>
           <a:p>
             <a:pPr marL="285750" indent="-285750">
@@ -13724,7 +13713,7 @@
               <a:buChar char="•"/>
             </a:pPr>
             <a:r>
-              <a:rPr lang="pt-BR" sz="1600" dirty="0" smtClean="0"/>
+              <a:rPr lang="pt-BR" sz="1600" dirty="0"/>
               <a:t>Movimento no mercado brasileiro de 53,7 bilhões</a:t>
             </a:r>
           </a:p>
@@ -13741,10 +13730,9 @@
               <a:buChar char="•"/>
             </a:pPr>
             <a:r>
-              <a:rPr lang="pt-BR" sz="1600" dirty="0" smtClean="0"/>
+              <a:rPr lang="pt-BR" sz="1600" dirty="0"/>
               <a:t>Estados Unidos lidera com 290,2 bilhões  </a:t>
             </a:r>
-            <a:endParaRPr lang="pt-BR" sz="1600" dirty="0"/>
           </a:p>
           <a:p>
             <a:pPr marL="285750" indent="-285750">
@@ -14014,7 +14002,7 @@
         </p:blipFill>
         <p:spPr>
           <a:xfrm>
-            <a:off x="-108284" y="992160"/>
+            <a:off x="234616" y="1074710"/>
             <a:ext cx="5654842" cy="4151340"/>
           </a:xfrm>
           <a:prstGeom prst="rect">
@@ -14074,30 +14062,29 @@
           <a:lstStyle/>
           <a:p>
             <a:r>
-              <a:rPr lang="en-US" dirty="0" err="1" smtClean="0"/>
+              <a:rPr lang="en-US" dirty="0" err="1"/>
               <a:t>Protótipo</a:t>
             </a:r>
             <a:r>
-              <a:rPr lang="en-US" dirty="0" smtClean="0"/>
+              <a:rPr lang="en-US" dirty="0"/>
               <a:t> de </a:t>
             </a:r>
             <a:r>
-              <a:rPr lang="en-US" dirty="0" err="1" smtClean="0"/>
+              <a:rPr lang="en-US" dirty="0" err="1"/>
               <a:t>tela</a:t>
             </a:r>
             <a:r>
-              <a:rPr lang="en-US" dirty="0" smtClean="0"/>
+              <a:rPr lang="en-US" dirty="0"/>
               <a:t> – </a:t>
             </a:r>
             <a:r>
-              <a:rPr lang="en-US" dirty="0" err="1" smtClean="0"/>
+              <a:rPr lang="en-US" dirty="0" err="1"/>
               <a:t>WireFrame</a:t>
             </a:r>
             <a:r>
-              <a:rPr lang="en-US" dirty="0" smtClean="0"/>
+              <a:rPr lang="en-US" dirty="0"/>
               <a:t> - Site</a:t>
             </a:r>
-            <a:endParaRPr lang="en-US" dirty="0"/>
           </a:p>
         </p:txBody>
       </p:sp>
@@ -14221,30 +14208,29 @@
           <a:lstStyle/>
           <a:p>
             <a:r>
-              <a:rPr lang="en-US" dirty="0" err="1" smtClean="0"/>
+              <a:rPr lang="en-US" dirty="0" err="1"/>
               <a:t>Protótipo</a:t>
             </a:r>
             <a:r>
-              <a:rPr lang="en-US" dirty="0" smtClean="0"/>
+              <a:rPr lang="en-US" dirty="0"/>
               <a:t> de </a:t>
             </a:r>
             <a:r>
-              <a:rPr lang="en-US" dirty="0" err="1" smtClean="0"/>
+              <a:rPr lang="en-US" dirty="0" err="1"/>
               <a:t>tela</a:t>
             </a:r>
             <a:r>
-              <a:rPr lang="en-US" dirty="0" smtClean="0"/>
+              <a:rPr lang="en-US" dirty="0"/>
               <a:t> – </a:t>
             </a:r>
             <a:r>
-              <a:rPr lang="en-US" dirty="0" err="1" smtClean="0"/>
+              <a:rPr lang="en-US" dirty="0" err="1"/>
               <a:t>WireFrame</a:t>
             </a:r>
             <a:r>
-              <a:rPr lang="en-US" dirty="0" smtClean="0"/>
+              <a:rPr lang="en-US" dirty="0"/>
               <a:t> - Login</a:t>
             </a:r>
-            <a:endParaRPr lang="en-US" dirty="0"/>
           </a:p>
         </p:txBody>
       </p:sp>
@@ -14368,31 +14354,31 @@
           <a:lstStyle/>
           <a:p>
             <a:r>
-              <a:rPr lang="en-US" dirty="0" err="1" smtClean="0"/>
+              <a:rPr lang="en-US" dirty="0" err="1"/>
               <a:t>Protótipo</a:t>
             </a:r>
             <a:r>
-              <a:rPr lang="en-US" dirty="0" smtClean="0"/>
+              <a:rPr lang="en-US" dirty="0"/>
               <a:t> de </a:t>
             </a:r>
             <a:r>
-              <a:rPr lang="en-US" dirty="0" err="1" smtClean="0"/>
+              <a:rPr lang="en-US" dirty="0" err="1"/>
               <a:t>tela</a:t>
             </a:r>
             <a:r>
-              <a:rPr lang="en-US" dirty="0" smtClean="0"/>
+              <a:rPr lang="en-US" dirty="0"/>
               <a:t> – </a:t>
             </a:r>
             <a:r>
-              <a:rPr lang="en-US" dirty="0" err="1" smtClean="0"/>
+              <a:rPr lang="en-US" dirty="0" err="1"/>
               <a:t>WireFrame</a:t>
             </a:r>
             <a:r>
-              <a:rPr lang="en-US" dirty="0" smtClean="0"/>
+              <a:rPr lang="en-US" dirty="0"/>
               <a:t> - </a:t>
             </a:r>
             <a:r>
-              <a:rPr lang="en-US" dirty="0" err="1" smtClean="0"/>
+              <a:rPr lang="en-US" dirty="0" err="1"/>
               <a:t>Cadastro</a:t>
             </a:r>
             <a:endParaRPr lang="en-US" dirty="0"/>
@@ -14519,31 +14505,31 @@
           <a:lstStyle/>
           <a:p>
             <a:r>
-              <a:rPr lang="en-US" dirty="0" err="1" smtClean="0"/>
+              <a:rPr lang="en-US" dirty="0" err="1"/>
               <a:t>Protótipo</a:t>
             </a:r>
             <a:r>
-              <a:rPr lang="en-US" dirty="0" smtClean="0"/>
+              <a:rPr lang="en-US" dirty="0"/>
               <a:t> de </a:t>
             </a:r>
             <a:r>
-              <a:rPr lang="en-US" dirty="0" err="1" smtClean="0"/>
+              <a:rPr lang="en-US" dirty="0" err="1"/>
               <a:t>tela</a:t>
             </a:r>
             <a:r>
-              <a:rPr lang="en-US" dirty="0" smtClean="0"/>
+              <a:rPr lang="en-US" dirty="0"/>
               <a:t> – </a:t>
             </a:r>
             <a:r>
-              <a:rPr lang="en-US" dirty="0" err="1" smtClean="0"/>
+              <a:rPr lang="en-US" dirty="0" err="1"/>
               <a:t>WireFrame</a:t>
             </a:r>
             <a:r>
-              <a:rPr lang="en-US" dirty="0" smtClean="0"/>
+              <a:rPr lang="en-US" dirty="0"/>
               <a:t> - </a:t>
             </a:r>
             <a:r>
-              <a:rPr lang="en-US" dirty="0" err="1" smtClean="0"/>
+              <a:rPr lang="en-US" dirty="0" err="1"/>
               <a:t>DashBoard</a:t>
             </a:r>
             <a:endParaRPr lang="en-US" dirty="0"/>
@@ -14670,42 +14656,37 @@
           <a:lstStyle/>
           <a:p>
             <a:r>
-              <a:rPr lang="en-US" dirty="0" err="1" smtClean="0"/>
+              <a:rPr lang="en-US" dirty="0" err="1"/>
               <a:t>Protótipo</a:t>
             </a:r>
             <a:r>
-              <a:rPr lang="en-US" dirty="0" smtClean="0"/>
+              <a:rPr lang="en-US" dirty="0"/>
               <a:t> de </a:t>
             </a:r>
             <a:r>
-              <a:rPr lang="en-US" dirty="0" err="1" smtClean="0"/>
+              <a:rPr lang="en-US" dirty="0" err="1"/>
               <a:t>tela</a:t>
             </a:r>
             <a:r>
-              <a:rPr lang="en-US" dirty="0" smtClean="0"/>
+              <a:rPr lang="en-US" dirty="0"/>
               <a:t> – </a:t>
             </a:r>
             <a:r>
-              <a:rPr lang="en-US" dirty="0" err="1" smtClean="0"/>
+              <a:rPr lang="en-US" dirty="0" err="1"/>
               <a:t>WireFrame</a:t>
             </a:r>
             <a:r>
-              <a:rPr lang="en-US" dirty="0" smtClean="0"/>
-              <a:t> </a:t>
+              <a:rPr lang="en-US" dirty="0"/>
+              <a:t> – </a:t>
             </a:r>
             <a:r>
-              <a:rPr lang="en-US" dirty="0" smtClean="0"/>
-              <a:t>– </a:t>
-            </a:r>
-            <a:r>
-              <a:rPr lang="en-US" dirty="0" err="1" smtClean="0"/>
+              <a:rPr lang="en-US" dirty="0" err="1"/>
               <a:t>DashBoard</a:t>
             </a:r>
             <a:r>
-              <a:rPr lang="en-US" dirty="0" smtClean="0"/>
+              <a:rPr lang="en-US" dirty="0"/>
               <a:t> Local</a:t>
             </a:r>
-            <a:endParaRPr lang="en-US" dirty="0"/>
           </a:p>
         </p:txBody>
       </p:sp>
@@ -14838,21 +14819,8 @@
                   <a:schemeClr val="accent5"/>
                 </a:solidFill>
               </a:rPr>
-              <a:t>SITE/ PLANNER/ </a:t>
+              <a:t>SITE/ PLANNER/ API/ DASHBOARD</a:t>
             </a:r>
-            <a:r>
-              <a:rPr lang="en" sz="6600" dirty="0" smtClean="0">
-                <a:solidFill>
-                  <a:schemeClr val="accent5"/>
-                </a:solidFill>
-              </a:rPr>
-              <a:t>API/ DASHBOARD</a:t>
-            </a:r>
-            <a:endParaRPr lang="en" sz="6600" dirty="0">
-              <a:solidFill>
-                <a:schemeClr val="accent5"/>
-              </a:solidFill>
-            </a:endParaRPr>
           </a:p>
         </p:txBody>
       </p:sp>
@@ -19527,7 +19495,7 @@
           <a:blip r:embed="rId4">
             <a:extLst>
               <a:ext uri="{96DAC541-7B7A-43D3-8B79-37D633B846F1}">
-                <asvg:svgBlip xmlns:asvg="http://schemas.microsoft.com/office/drawing/2016/SVG/main" xmlns="" r:embed="rId5"/>
+                <asvg:svgBlip xmlns:asvg="http://schemas.microsoft.com/office/drawing/2016/SVG/main" r:embed="rId5"/>
               </a:ext>
             </a:extLst>
           </a:blip>
@@ -19728,7 +19696,7 @@
           <a:blip r:embed="rId3">
             <a:extLst>
               <a:ext uri="{96DAC541-7B7A-43D3-8B79-37D633B846F1}">
-                <asvg:svgBlip xmlns:asvg="http://schemas.microsoft.com/office/drawing/2016/SVG/main" xmlns="" r:embed="rId4"/>
+                <asvg:svgBlip xmlns:asvg="http://schemas.microsoft.com/office/drawing/2016/SVG/main" r:embed="rId4"/>
               </a:ext>
             </a:extLst>
           </a:blip>
@@ -20152,7 +20120,7 @@
                   <a14:useLocalDpi xmlns:a14="http://schemas.microsoft.com/office/drawing/2010/main" val="0"/>
                 </a:ext>
                 <a:ext uri="{96DAC541-7B7A-43D3-8B79-37D633B846F1}">
-                  <asvg:svgBlip xmlns:asvg="http://schemas.microsoft.com/office/drawing/2016/SVG/main" xmlns="" r:embed="rId4"/>
+                  <asvg:svgBlip xmlns:asvg="http://schemas.microsoft.com/office/drawing/2016/SVG/main" r:embed="rId4"/>
                 </a:ext>
               </a:extLst>
             </a:blip>
@@ -20595,7 +20563,7 @@
                   <a14:useLocalDpi xmlns:a14="http://schemas.microsoft.com/office/drawing/2010/main" val="0"/>
                 </a:ext>
                 <a:ext uri="{96DAC541-7B7A-43D3-8B79-37D633B846F1}">
-                  <asvg:svgBlip xmlns:asvg="http://schemas.microsoft.com/office/drawing/2016/SVG/main" xmlns="" r:embed="rId4"/>
+                  <asvg:svgBlip xmlns:asvg="http://schemas.microsoft.com/office/drawing/2016/SVG/main" r:embed="rId4"/>
                 </a:ext>
               </a:extLst>
             </a:blip>
@@ -20817,7 +20785,7 @@
                   <a:schemeClr val="bg1"/>
                 </a:solidFill>
               </a:rPr>
-              <a:t>Perca de clientes</a:t>
+              <a:t>Perda de clientes</a:t>
             </a:r>
           </a:p>
         </p:txBody>
@@ -21062,7 +21030,7 @@
                   <a14:useLocalDpi xmlns:a14="http://schemas.microsoft.com/office/drawing/2010/main" val="0"/>
                 </a:ext>
                 <a:ext uri="{96DAC541-7B7A-43D3-8B79-37D633B846F1}">
-                  <asvg:svgBlip xmlns:asvg="http://schemas.microsoft.com/office/drawing/2016/SVG/main" xmlns="" r:embed="rId4"/>
+                  <asvg:svgBlip xmlns:asvg="http://schemas.microsoft.com/office/drawing/2016/SVG/main" r:embed="rId4"/>
                 </a:ext>
               </a:extLst>
             </a:blip>
@@ -21348,11 +21316,7 @@
             </a:pPr>
             <a:r>
               <a:rPr lang="en" dirty="0"/>
-              <a:t>E</a:t>
-            </a:r>
-            <a:r>
-              <a:rPr lang="en" dirty="0" smtClean="0"/>
-              <a:t>NTREGAVEIS</a:t>
+              <a:t>ENTREGAVEIS</a:t>
             </a:r>
             <a:endParaRPr lang="en-US" dirty="0"/>
           </a:p>

</xml_diff>